<commit_message>
Added Talon FX slides and exercises. Added Driver Station Input/Output.
</commit_message>
<xml_diff>
--- a/Lesson6/AdvancedRoboticsLesson6.pptx
+++ b/Lesson6/AdvancedRoboticsLesson6.pptx
@@ -5,7 +5,7 @@
     <p:sldMasterId id="2147483648" r:id="rId1"/>
   </p:sldMasterIdLst>
   <p:notesMasterIdLst>
-    <p:notesMasterId r:id="rId12"/>
+    <p:notesMasterId r:id="rId16"/>
   </p:notesMasterIdLst>
   <p:sldIdLst>
     <p:sldId id="266" r:id="rId2"/>
@@ -18,6 +18,10 @@
     <p:sldId id="283" r:id="rId9"/>
     <p:sldId id="281" r:id="rId10"/>
     <p:sldId id="284" r:id="rId11"/>
+    <p:sldId id="285" r:id="rId12"/>
+    <p:sldId id="286" r:id="rId13"/>
+    <p:sldId id="287" r:id="rId14"/>
+    <p:sldId id="288" r:id="rId15"/>
   </p:sldIdLst>
   <p:sldSz cx="12192000" cy="6858000"/>
   <p:notesSz cx="6858000" cy="9144000"/>
@@ -13815,7 +13819,7 @@
             <a:pPr lvl="1"/>
             <a:r>
               <a:rPr lang="en-US" dirty="0"/>
-              <a:t>Create and configure a FrcI2cLEDAddressableLED object.</a:t>
+              <a:t>Create and configure a FrcI2cLEDPanel object.</a:t>
             </a:r>
           </a:p>
           <a:p>
@@ -13838,6 +13842,814 @@
     <p:extLst>
       <p:ext uri="{BB962C8B-B14F-4D97-AF65-F5344CB8AC3E}">
         <p14:creationId xmlns:p14="http://schemas.microsoft.com/office/powerpoint/2010/main" val="671454949"/>
+      </p:ext>
+    </p:extLst>
+  </p:cSld>
+  <p:clrMapOvr>
+    <a:masterClrMapping/>
+  </p:clrMapOvr>
+</p:sld>
+</file>
+
+<file path=ppt/slides/slide11.xml><?xml version="1.0" encoding="utf-8"?>
+<p:sld xmlns:a="http://schemas.openxmlformats.org/drawingml/2006/main" xmlns:r="http://schemas.openxmlformats.org/officeDocument/2006/relationships" xmlns:p="http://schemas.openxmlformats.org/presentationml/2006/main">
+  <p:cSld>
+    <p:spTree>
+      <p:nvGrpSpPr>
+        <p:cNvPr id="1" name=""/>
+        <p:cNvGrpSpPr/>
+        <p:nvPr/>
+      </p:nvGrpSpPr>
+      <p:grpSpPr>
+        <a:xfrm>
+          <a:off x="0" y="0"/>
+          <a:ext cx="0" cy="0"/>
+          <a:chOff x="0" y="0"/>
+          <a:chExt cx="0" cy="0"/>
+        </a:xfrm>
+      </p:grpSpPr>
+      <p:sp>
+        <p:nvSpPr>
+          <p:cNvPr id="2" name="Title 1">
+            <a:extLst>
+              <a:ext uri="{FF2B5EF4-FFF2-40B4-BE49-F238E27FC236}">
+                <a16:creationId xmlns:a16="http://schemas.microsoft.com/office/drawing/2014/main" id="{F0CC69AE-8888-460A-9C25-3C0B9C277BEF}"/>
+              </a:ext>
+            </a:extLst>
+          </p:cNvPr>
+          <p:cNvSpPr>
+            <a:spLocks noGrp="1"/>
+          </p:cNvSpPr>
+          <p:nvPr>
+            <p:ph type="title"/>
+          </p:nvPr>
+        </p:nvSpPr>
+        <p:spPr>
+          <a:xfrm>
+            <a:off x="1154954" y="973668"/>
+            <a:ext cx="9440341" cy="706964"/>
+          </a:xfrm>
+        </p:spPr>
+        <p:txBody>
+          <a:bodyPr/>
+          <a:lstStyle/>
+          <a:p>
+            <a:r>
+              <a:rPr lang="en-US" dirty="0"/>
+              <a:t>Playing Music Using Talon FX (Falcon 500)</a:t>
+            </a:r>
+          </a:p>
+        </p:txBody>
+      </p:sp>
+      <p:sp>
+        <p:nvSpPr>
+          <p:cNvPr id="3" name="Content Placeholder 2">
+            <a:extLst>
+              <a:ext uri="{FF2B5EF4-FFF2-40B4-BE49-F238E27FC236}">
+                <a16:creationId xmlns:a16="http://schemas.microsoft.com/office/drawing/2014/main" id="{8FE38F20-2E17-41D8-8A5C-3250B31663F1}"/>
+              </a:ext>
+            </a:extLst>
+          </p:cNvPr>
+          <p:cNvSpPr>
+            <a:spLocks noGrp="1"/>
+          </p:cNvSpPr>
+          <p:nvPr>
+            <p:ph idx="1"/>
+          </p:nvPr>
+        </p:nvSpPr>
+        <p:spPr>
+          <a:xfrm>
+            <a:off x="629174" y="2231472"/>
+            <a:ext cx="10771465" cy="4387442"/>
+          </a:xfrm>
+        </p:spPr>
+        <p:txBody>
+          <a:bodyPr>
+            <a:normAutofit/>
+          </a:bodyPr>
+          <a:lstStyle/>
+          <a:p>
+            <a:r>
+              <a:rPr lang="en-US" dirty="0"/>
+              <a:t>Talon FX is a motor controller. It can play music! What?! Really?! Yes, it can play “Chirp” music files (generated from MIDI), one motor per track.</a:t>
+            </a:r>
+          </a:p>
+          <a:p>
+            <a:pPr lvl="1"/>
+            <a:r>
+              <a:rPr lang="en-US" dirty="0"/>
+              <a:t>Constructor of Orchestra object: Collection of </a:t>
+            </a:r>
+            <a:r>
+              <a:rPr lang="en-US" dirty="0" err="1"/>
+              <a:t>TalonFX</a:t>
+            </a:r>
+            <a:r>
+              <a:rPr lang="en-US" dirty="0"/>
+              <a:t> motor controllers, Music .</a:t>
+            </a:r>
+            <a:r>
+              <a:rPr lang="en-US" dirty="0" err="1"/>
+              <a:t>chrp</a:t>
+            </a:r>
+            <a:r>
+              <a:rPr lang="en-US" dirty="0"/>
+              <a:t> file.</a:t>
+            </a:r>
+            <a:br>
+              <a:rPr lang="en-US" dirty="0"/>
+            </a:br>
+            <a:r>
+              <a:rPr lang="en-US" dirty="0"/>
+              <a:t>(</a:t>
+            </a:r>
+            <a:r>
+              <a:rPr lang="en-US" dirty="0" err="1">
+                <a:hlinkClick r:id="rId2"/>
+              </a:rPr>
+              <a:t>CTRE_Phoenix</a:t>
+            </a:r>
+            <a:r>
+              <a:rPr lang="en-US" dirty="0">
+                <a:hlinkClick r:id="rId2"/>
+              </a:rPr>
+              <a:t>: </a:t>
+            </a:r>
+            <a:r>
+              <a:rPr lang="en-US" dirty="0" err="1">
+                <a:hlinkClick r:id="rId2"/>
+              </a:rPr>
+              <a:t>com.ctre.phoenix.music.Orchestra</a:t>
+            </a:r>
+            <a:r>
+              <a:rPr lang="en-US" dirty="0">
+                <a:hlinkClick r:id="rId2"/>
+              </a:rPr>
+              <a:t> Class Reference (ctr-electronics.com)</a:t>
+            </a:r>
+            <a:endParaRPr lang="en-US" dirty="0"/>
+          </a:p>
+          <a:p>
+            <a:pPr lvl="1"/>
+            <a:r>
+              <a:rPr lang="en-US" dirty="0"/>
+              <a:t>Methods:</a:t>
+            </a:r>
+          </a:p>
+          <a:p>
+            <a:pPr lvl="2"/>
+            <a:r>
+              <a:rPr lang="en-US" dirty="0" err="1"/>
+              <a:t>addInstrument</a:t>
+            </a:r>
+            <a:r>
+              <a:rPr lang="en-US" dirty="0"/>
+              <a:t> – Add a motor to the list.</a:t>
+            </a:r>
+          </a:p>
+          <a:p>
+            <a:pPr lvl="2"/>
+            <a:r>
+              <a:rPr lang="en-US" dirty="0" err="1"/>
+              <a:t>clearInstruments</a:t>
+            </a:r>
+            <a:r>
+              <a:rPr lang="en-US" dirty="0"/>
+              <a:t> – Clears the motor list.</a:t>
+            </a:r>
+          </a:p>
+          <a:p>
+            <a:pPr lvl="2"/>
+            <a:r>
+              <a:rPr lang="en-US" dirty="0" err="1"/>
+              <a:t>loadMusic</a:t>
+            </a:r>
+            <a:r>
+              <a:rPr lang="en-US" dirty="0"/>
+              <a:t> – Loads a chirp file.</a:t>
+            </a:r>
+          </a:p>
+          <a:p>
+            <a:pPr lvl="2"/>
+            <a:r>
+              <a:rPr lang="en-US" dirty="0"/>
+              <a:t>play – Plays the music file.</a:t>
+            </a:r>
+          </a:p>
+          <a:p>
+            <a:pPr lvl="2"/>
+            <a:r>
+              <a:rPr lang="en-US" dirty="0"/>
+              <a:t>stop – Stop playing music.</a:t>
+            </a:r>
+          </a:p>
+          <a:p>
+            <a:pPr lvl="2"/>
+            <a:r>
+              <a:rPr lang="en-US" dirty="0"/>
+              <a:t>pause – Pause playing music.</a:t>
+            </a:r>
+          </a:p>
+          <a:p>
+            <a:pPr lvl="2"/>
+            <a:r>
+              <a:rPr lang="en-US" dirty="0" err="1"/>
+              <a:t>isPlaying</a:t>
+            </a:r>
+            <a:r>
+              <a:rPr lang="en-US" dirty="0"/>
+              <a:t> – Checks if music is playing.</a:t>
+            </a:r>
+          </a:p>
+        </p:txBody>
+      </p:sp>
+    </p:spTree>
+    <p:extLst>
+      <p:ext uri="{BB962C8B-B14F-4D97-AF65-F5344CB8AC3E}">
+        <p14:creationId xmlns:p14="http://schemas.microsoft.com/office/powerpoint/2010/main" val="2637508114"/>
+      </p:ext>
+    </p:extLst>
+  </p:cSld>
+  <p:clrMapOvr>
+    <a:masterClrMapping/>
+  </p:clrMapOvr>
+</p:sld>
+</file>
+
+<file path=ppt/slides/slide12.xml><?xml version="1.0" encoding="utf-8"?>
+<p:sld xmlns:a="http://schemas.openxmlformats.org/drawingml/2006/main" xmlns:r="http://schemas.openxmlformats.org/officeDocument/2006/relationships" xmlns:p="http://schemas.openxmlformats.org/presentationml/2006/main">
+  <p:cSld>
+    <p:spTree>
+      <p:nvGrpSpPr>
+        <p:cNvPr id="1" name=""/>
+        <p:cNvGrpSpPr/>
+        <p:nvPr/>
+      </p:nvGrpSpPr>
+      <p:grpSpPr>
+        <a:xfrm>
+          <a:off x="0" y="0"/>
+          <a:ext cx="0" cy="0"/>
+          <a:chOff x="0" y="0"/>
+          <a:chExt cx="0" cy="0"/>
+        </a:xfrm>
+      </p:grpSpPr>
+      <p:sp>
+        <p:nvSpPr>
+          <p:cNvPr id="2" name="Title 1">
+            <a:extLst>
+              <a:ext uri="{FF2B5EF4-FFF2-40B4-BE49-F238E27FC236}">
+                <a16:creationId xmlns:a16="http://schemas.microsoft.com/office/drawing/2014/main" id="{EAA4390D-3BFD-4233-ABD6-147E253EB68A}"/>
+              </a:ext>
+            </a:extLst>
+          </p:cNvPr>
+          <p:cNvSpPr>
+            <a:spLocks noGrp="1"/>
+          </p:cNvSpPr>
+          <p:nvPr>
+            <p:ph type="title"/>
+          </p:nvPr>
+        </p:nvSpPr>
+        <p:spPr>
+          <a:xfrm>
+            <a:off x="478172" y="973668"/>
+            <a:ext cx="11174136" cy="706964"/>
+          </a:xfrm>
+        </p:spPr>
+        <p:txBody>
+          <a:bodyPr/>
+          <a:lstStyle/>
+          <a:p>
+            <a:r>
+              <a:rPr lang="en-US" dirty="0"/>
+              <a:t>Exercise 5: Start/Pause Playing Song Using Buttons</a:t>
+            </a:r>
+          </a:p>
+        </p:txBody>
+      </p:sp>
+      <p:sp>
+        <p:nvSpPr>
+          <p:cNvPr id="3" name="Content Placeholder 2">
+            <a:extLst>
+              <a:ext uri="{FF2B5EF4-FFF2-40B4-BE49-F238E27FC236}">
+                <a16:creationId xmlns:a16="http://schemas.microsoft.com/office/drawing/2014/main" id="{F53B54C5-5556-4DA6-8E0E-8EADBD95B226}"/>
+              </a:ext>
+            </a:extLst>
+          </p:cNvPr>
+          <p:cNvSpPr>
+            <a:spLocks noGrp="1"/>
+          </p:cNvSpPr>
+          <p:nvPr>
+            <p:ph idx="1"/>
+          </p:nvPr>
+        </p:nvSpPr>
+        <p:spPr/>
+        <p:txBody>
+          <a:bodyPr>
+            <a:normAutofit/>
+          </a:bodyPr>
+          <a:lstStyle/>
+          <a:p>
+            <a:r>
+              <a:rPr lang="en-US" dirty="0"/>
+              <a:t>Control 4 Talon FX motors to play 4 tracks of music from a chirp file using one joystick button to start/pause music and another button to stop music.</a:t>
+            </a:r>
+          </a:p>
+          <a:p>
+            <a:pPr lvl="1"/>
+            <a:r>
+              <a:rPr lang="en-US" dirty="0"/>
+              <a:t>Create and configure a game controller and hook a button event handler to it.</a:t>
+            </a:r>
+          </a:p>
+          <a:p>
+            <a:pPr lvl="1"/>
+            <a:r>
+              <a:rPr lang="en-US" dirty="0"/>
+              <a:t>Create and configure 4 Talon FX motor controllers.</a:t>
+            </a:r>
+          </a:p>
+          <a:p>
+            <a:pPr lvl="1"/>
+            <a:r>
+              <a:rPr lang="en-US" dirty="0"/>
+              <a:t>Create and configure an Orchestra object (</a:t>
+            </a:r>
+            <a:r>
+              <a:rPr lang="en-US" dirty="0" err="1"/>
+              <a:t>com.ctre.phoenix.music.Orchestra</a:t>
+            </a:r>
+            <a:r>
+              <a:rPr lang="en-US" dirty="0"/>
+              <a:t>).</a:t>
+            </a:r>
+          </a:p>
+          <a:p>
+            <a:pPr lvl="1"/>
+            <a:r>
+              <a:rPr lang="en-US" dirty="0"/>
+              <a:t>Load a chirp music file (e.g. </a:t>
+            </a:r>
+            <a:r>
+              <a:rPr lang="en-US" dirty="0" err="1"/>
+              <a:t>BumbleBee.chrp</a:t>
+            </a:r>
+            <a:r>
+              <a:rPr lang="en-US" dirty="0"/>
+              <a:t>).</a:t>
+            </a:r>
+          </a:p>
+          <a:p>
+            <a:pPr lvl="1"/>
+            <a:r>
+              <a:rPr lang="en-US" dirty="0"/>
+              <a:t>Add code to the button event handler so that one button toggles play/pause music and another button stops the music.</a:t>
+            </a:r>
+          </a:p>
+        </p:txBody>
+      </p:sp>
+    </p:spTree>
+    <p:extLst>
+      <p:ext uri="{BB962C8B-B14F-4D97-AF65-F5344CB8AC3E}">
+        <p14:creationId xmlns:p14="http://schemas.microsoft.com/office/powerpoint/2010/main" val="1562590749"/>
+      </p:ext>
+    </p:extLst>
+  </p:cSld>
+  <p:clrMapOvr>
+    <a:masterClrMapping/>
+  </p:clrMapOvr>
+</p:sld>
+</file>
+
+<file path=ppt/slides/slide13.xml><?xml version="1.0" encoding="utf-8"?>
+<p:sld xmlns:a="http://schemas.openxmlformats.org/drawingml/2006/main" xmlns:r="http://schemas.openxmlformats.org/officeDocument/2006/relationships" xmlns:p="http://schemas.openxmlformats.org/presentationml/2006/main">
+  <p:cSld>
+    <p:spTree>
+      <p:nvGrpSpPr>
+        <p:cNvPr id="1" name=""/>
+        <p:cNvGrpSpPr/>
+        <p:nvPr/>
+      </p:nvGrpSpPr>
+      <p:grpSpPr>
+        <a:xfrm>
+          <a:off x="0" y="0"/>
+          <a:ext cx="0" cy="0"/>
+          <a:chOff x="0" y="0"/>
+          <a:chExt cx="0" cy="0"/>
+        </a:xfrm>
+      </p:grpSpPr>
+      <p:sp>
+        <p:nvSpPr>
+          <p:cNvPr id="2" name="Title 1">
+            <a:extLst>
+              <a:ext uri="{FF2B5EF4-FFF2-40B4-BE49-F238E27FC236}">
+                <a16:creationId xmlns:a16="http://schemas.microsoft.com/office/drawing/2014/main" id="{F0CC69AE-8888-460A-9C25-3C0B9C277BEF}"/>
+              </a:ext>
+            </a:extLst>
+          </p:cNvPr>
+          <p:cNvSpPr>
+            <a:spLocks noGrp="1"/>
+          </p:cNvSpPr>
+          <p:nvPr>
+            <p:ph type="title"/>
+          </p:nvPr>
+        </p:nvSpPr>
+        <p:spPr>
+          <a:xfrm>
+            <a:off x="1154954" y="973668"/>
+            <a:ext cx="9440341" cy="706964"/>
+          </a:xfrm>
+        </p:spPr>
+        <p:txBody>
+          <a:bodyPr/>
+          <a:lstStyle/>
+          <a:p>
+            <a:r>
+              <a:rPr lang="en-US" dirty="0"/>
+              <a:t>Input/Output on the Driver Station</a:t>
+            </a:r>
+          </a:p>
+        </p:txBody>
+      </p:sp>
+      <p:sp>
+        <p:nvSpPr>
+          <p:cNvPr id="3" name="Content Placeholder 2">
+            <a:extLst>
+              <a:ext uri="{FF2B5EF4-FFF2-40B4-BE49-F238E27FC236}">
+                <a16:creationId xmlns:a16="http://schemas.microsoft.com/office/drawing/2014/main" id="{8FE38F20-2E17-41D8-8A5C-3250B31663F1}"/>
+              </a:ext>
+            </a:extLst>
+          </p:cNvPr>
+          <p:cNvSpPr>
+            <a:spLocks noGrp="1"/>
+          </p:cNvSpPr>
+          <p:nvPr>
+            <p:ph idx="1"/>
+          </p:nvPr>
+        </p:nvSpPr>
+        <p:spPr>
+          <a:xfrm>
+            <a:off x="629174" y="2231472"/>
+            <a:ext cx="10771465" cy="4626528"/>
+          </a:xfrm>
+        </p:spPr>
+        <p:txBody>
+          <a:bodyPr>
+            <a:normAutofit fontScale="70000" lnSpcReduction="20000"/>
+          </a:bodyPr>
+          <a:lstStyle/>
+          <a:p>
+            <a:r>
+              <a:rPr lang="en-US" dirty="0" err="1"/>
+              <a:t>HalDashboard</a:t>
+            </a:r>
+            <a:r>
+              <a:rPr lang="en-US" dirty="0"/>
+              <a:t> can be used to display information on the Driver Station.</a:t>
+            </a:r>
+          </a:p>
+          <a:p>
+            <a:pPr lvl="1"/>
+            <a:r>
+              <a:rPr lang="en-US" dirty="0"/>
+              <a:t>Constructor: No need to instantiate it because </a:t>
+            </a:r>
+            <a:r>
+              <a:rPr lang="en-US" dirty="0" err="1"/>
+              <a:t>HalDashboard</a:t>
+            </a:r>
+            <a:r>
+              <a:rPr lang="en-US" dirty="0"/>
+              <a:t> always exists when the robot program is loaded. Just need to call </a:t>
+            </a:r>
+            <a:r>
+              <a:rPr lang="en-US" dirty="0" err="1"/>
+              <a:t>HalDashboard.getInstance</a:t>
+            </a:r>
+            <a:r>
+              <a:rPr lang="en-US" dirty="0"/>
+              <a:t>().</a:t>
+            </a:r>
+          </a:p>
+          <a:p>
+            <a:pPr lvl="1"/>
+            <a:r>
+              <a:rPr lang="en-US" dirty="0"/>
+              <a:t>Methods:</a:t>
+            </a:r>
+          </a:p>
+          <a:p>
+            <a:pPr lvl="2"/>
+            <a:r>
+              <a:rPr lang="en-US" dirty="0" err="1"/>
+              <a:t>displayPrintf</a:t>
+            </a:r>
+            <a:r>
+              <a:rPr lang="en-US" dirty="0"/>
+              <a:t> – Displays information on the “display panel” of lines.</a:t>
+            </a:r>
+          </a:p>
+          <a:p>
+            <a:pPr lvl="2"/>
+            <a:r>
+              <a:rPr lang="en-US" dirty="0" err="1"/>
+              <a:t>clearDisplay</a:t>
+            </a:r>
+            <a:r>
+              <a:rPr lang="en-US" dirty="0"/>
+              <a:t> – Clears the display panel.</a:t>
+            </a:r>
+          </a:p>
+          <a:p>
+            <a:pPr lvl="2"/>
+            <a:r>
+              <a:rPr lang="en-US" dirty="0" err="1"/>
+              <a:t>putNumber</a:t>
+            </a:r>
+            <a:r>
+              <a:rPr lang="en-US" dirty="0"/>
+              <a:t> – Stores a number associated with the given key.</a:t>
+            </a:r>
+          </a:p>
+          <a:p>
+            <a:pPr lvl="2"/>
+            <a:r>
+              <a:rPr lang="en-US" dirty="0" err="1"/>
+              <a:t>putString</a:t>
+            </a:r>
+            <a:r>
+              <a:rPr lang="en-US" dirty="0"/>
+              <a:t> – Stores a string associated with the given key.</a:t>
+            </a:r>
+          </a:p>
+          <a:p>
+            <a:pPr lvl="2"/>
+            <a:r>
+              <a:rPr lang="en-US" dirty="0" err="1"/>
+              <a:t>putBoolean</a:t>
+            </a:r>
+            <a:r>
+              <a:rPr lang="en-US" dirty="0"/>
+              <a:t> – Stores a Boolean state associated with the given key.</a:t>
+            </a:r>
+          </a:p>
+          <a:p>
+            <a:pPr lvl="2"/>
+            <a:r>
+              <a:rPr lang="en-US" dirty="0" err="1"/>
+              <a:t>putData</a:t>
+            </a:r>
+            <a:r>
+              <a:rPr lang="en-US" dirty="0"/>
+              <a:t> – Stores a data object associated with the given key.</a:t>
+            </a:r>
+          </a:p>
+          <a:p>
+            <a:pPr lvl="2"/>
+            <a:r>
+              <a:rPr lang="en-US" dirty="0"/>
+              <a:t>get* - get data associated with the given key from the Driver Station.</a:t>
+            </a:r>
+          </a:p>
+          <a:p>
+            <a:r>
+              <a:rPr lang="en-US" dirty="0" err="1"/>
+              <a:t>FrcChoiceMenu</a:t>
+            </a:r>
+            <a:r>
+              <a:rPr lang="en-US" dirty="0"/>
+              <a:t> is used to present choices to the drivers to select match options on the Driver Station.</a:t>
+            </a:r>
+          </a:p>
+          <a:p>
+            <a:pPr lvl="1"/>
+            <a:r>
+              <a:rPr lang="en-US" dirty="0"/>
+              <a:t>Constructor: menu title.</a:t>
+            </a:r>
+          </a:p>
+          <a:p>
+            <a:pPr lvl="1"/>
+            <a:r>
+              <a:rPr lang="en-US" dirty="0"/>
+              <a:t>Methods:</a:t>
+            </a:r>
+          </a:p>
+          <a:p>
+            <a:pPr lvl="2"/>
+            <a:r>
+              <a:rPr lang="en-US" dirty="0" err="1"/>
+              <a:t>addChoice</a:t>
+            </a:r>
+            <a:r>
+              <a:rPr lang="en-US" dirty="0"/>
+              <a:t> – Adds a choice to the choice menu.</a:t>
+            </a:r>
+          </a:p>
+          <a:p>
+            <a:pPr lvl="2"/>
+            <a:r>
+              <a:rPr lang="en-US" dirty="0" err="1"/>
+              <a:t>getCurrentChoiceObject</a:t>
+            </a:r>
+            <a:r>
+              <a:rPr lang="en-US" dirty="0"/>
+              <a:t> – Gets the current choice data object.</a:t>
+            </a:r>
+          </a:p>
+          <a:p>
+            <a:pPr lvl="2"/>
+            <a:r>
+              <a:rPr lang="en-US" dirty="0" err="1"/>
+              <a:t>getCurrentChoiceText</a:t>
+            </a:r>
+            <a:r>
+              <a:rPr lang="en-US" dirty="0"/>
+              <a:t> – Gets the current choice text.</a:t>
+            </a:r>
+          </a:p>
+          <a:p>
+            <a:pPr lvl="2"/>
+            <a:r>
+              <a:rPr lang="en-US" dirty="0" err="1"/>
+              <a:t>getTitle</a:t>
+            </a:r>
+            <a:r>
+              <a:rPr lang="en-US" dirty="0"/>
+              <a:t> – Gets the menu title</a:t>
+            </a:r>
+          </a:p>
+        </p:txBody>
+      </p:sp>
+    </p:spTree>
+    <p:extLst>
+      <p:ext uri="{BB962C8B-B14F-4D97-AF65-F5344CB8AC3E}">
+        <p14:creationId xmlns:p14="http://schemas.microsoft.com/office/powerpoint/2010/main" val="892151892"/>
+      </p:ext>
+    </p:extLst>
+  </p:cSld>
+  <p:clrMapOvr>
+    <a:masterClrMapping/>
+  </p:clrMapOvr>
+</p:sld>
+</file>
+
+<file path=ppt/slides/slide14.xml><?xml version="1.0" encoding="utf-8"?>
+<p:sld xmlns:a="http://schemas.openxmlformats.org/drawingml/2006/main" xmlns:r="http://schemas.openxmlformats.org/officeDocument/2006/relationships" xmlns:p="http://schemas.openxmlformats.org/presentationml/2006/main">
+  <p:cSld>
+    <p:spTree>
+      <p:nvGrpSpPr>
+        <p:cNvPr id="1" name=""/>
+        <p:cNvGrpSpPr/>
+        <p:nvPr/>
+      </p:nvGrpSpPr>
+      <p:grpSpPr>
+        <a:xfrm>
+          <a:off x="0" y="0"/>
+          <a:ext cx="0" cy="0"/>
+          <a:chOff x="0" y="0"/>
+          <a:chExt cx="0" cy="0"/>
+        </a:xfrm>
+      </p:grpSpPr>
+      <p:sp>
+        <p:nvSpPr>
+          <p:cNvPr id="2" name="Title 1">
+            <a:extLst>
+              <a:ext uri="{FF2B5EF4-FFF2-40B4-BE49-F238E27FC236}">
+                <a16:creationId xmlns:a16="http://schemas.microsoft.com/office/drawing/2014/main" id="{EAA4390D-3BFD-4233-ABD6-147E253EB68A}"/>
+              </a:ext>
+            </a:extLst>
+          </p:cNvPr>
+          <p:cNvSpPr>
+            <a:spLocks noGrp="1"/>
+          </p:cNvSpPr>
+          <p:nvPr>
+            <p:ph type="title"/>
+          </p:nvPr>
+        </p:nvSpPr>
+        <p:spPr>
+          <a:xfrm>
+            <a:off x="478172" y="973668"/>
+            <a:ext cx="11174136" cy="706964"/>
+          </a:xfrm>
+        </p:spPr>
+        <p:txBody>
+          <a:bodyPr/>
+          <a:lstStyle/>
+          <a:p>
+            <a:r>
+              <a:rPr lang="en-US" dirty="0"/>
+              <a:t>Exercise 6: Create a Choice Menu for Robot Movements</a:t>
+            </a:r>
+          </a:p>
+        </p:txBody>
+      </p:sp>
+      <p:sp>
+        <p:nvSpPr>
+          <p:cNvPr id="3" name="Content Placeholder 2">
+            <a:extLst>
+              <a:ext uri="{FF2B5EF4-FFF2-40B4-BE49-F238E27FC236}">
+                <a16:creationId xmlns:a16="http://schemas.microsoft.com/office/drawing/2014/main" id="{F53B54C5-5556-4DA6-8E0E-8EADBD95B226}"/>
+              </a:ext>
+            </a:extLst>
+          </p:cNvPr>
+          <p:cNvSpPr>
+            <a:spLocks noGrp="1"/>
+          </p:cNvSpPr>
+          <p:nvPr>
+            <p:ph idx="1"/>
+          </p:nvPr>
+        </p:nvSpPr>
+        <p:spPr/>
+        <p:txBody>
+          <a:bodyPr>
+            <a:normAutofit fontScale="92500" lnSpcReduction="10000"/>
+          </a:bodyPr>
+          <a:lstStyle/>
+          <a:p>
+            <a:r>
+              <a:rPr lang="en-US" dirty="0"/>
+              <a:t>Similar to the exercise in robot drive base where we drive the robot forward/backward/strafe/turn using PID control but instead of using joystick buttons, we use choice menu.</a:t>
+            </a:r>
+          </a:p>
+          <a:p>
+            <a:pPr lvl="1"/>
+            <a:r>
+              <a:rPr lang="en-US" dirty="0"/>
+              <a:t>Create and configure 4 motors for a </a:t>
+            </a:r>
+            <a:r>
+              <a:rPr lang="en-US" dirty="0" err="1"/>
+              <a:t>mecanum</a:t>
+            </a:r>
+            <a:r>
+              <a:rPr lang="en-US" dirty="0"/>
+              <a:t> drive base.</a:t>
+            </a:r>
+          </a:p>
+          <a:p>
+            <a:pPr lvl="1"/>
+            <a:r>
+              <a:rPr lang="en-US" dirty="0"/>
+              <a:t>Create and configure an IMU (i.e. gyro among other things).</a:t>
+            </a:r>
+          </a:p>
+          <a:p>
+            <a:pPr lvl="1"/>
+            <a:r>
+              <a:rPr lang="en-US" dirty="0"/>
+              <a:t>Create and configure a </a:t>
+            </a:r>
+            <a:r>
+              <a:rPr lang="en-US" dirty="0" err="1"/>
+              <a:t>mecanum</a:t>
+            </a:r>
+            <a:r>
+              <a:rPr lang="en-US" dirty="0"/>
+              <a:t> drive base.</a:t>
+            </a:r>
+          </a:p>
+          <a:p>
+            <a:pPr lvl="1"/>
+            <a:r>
+              <a:rPr lang="en-US" dirty="0"/>
+              <a:t>Create and configure 3 PID controllers.</a:t>
+            </a:r>
+          </a:p>
+          <a:p>
+            <a:pPr lvl="1"/>
+            <a:r>
+              <a:rPr lang="en-US" dirty="0"/>
+              <a:t>Create and configure a PID Drive object with the drive base and 3 PID controllers.</a:t>
+            </a:r>
+          </a:p>
+          <a:p>
+            <a:pPr lvl="1"/>
+            <a:r>
+              <a:rPr lang="en-US" dirty="0"/>
+              <a:t>Create and configure a choice menu with 4 choices: drive forward 10 feet, strafe left 5 feet, drive backward 7 feet, turn left 90 degrees.</a:t>
+            </a:r>
+          </a:p>
+          <a:p>
+            <a:pPr lvl="1"/>
+            <a:r>
+              <a:rPr lang="en-US" dirty="0"/>
+              <a:t>Add code in </a:t>
+            </a:r>
+            <a:r>
+              <a:rPr lang="en-US" dirty="0" err="1"/>
+              <a:t>TeleOp</a:t>
+            </a:r>
+            <a:r>
+              <a:rPr lang="en-US" dirty="0"/>
+              <a:t> to read the choice entered and execute the action chose.</a:t>
+            </a:r>
+          </a:p>
+        </p:txBody>
+      </p:sp>
+    </p:spTree>
+    <p:extLst>
+      <p:ext uri="{BB962C8B-B14F-4D97-AF65-F5344CB8AC3E}">
+        <p14:creationId xmlns:p14="http://schemas.microsoft.com/office/powerpoint/2010/main" val="3047232960"/>
       </p:ext>
     </p:extLst>
   </p:cSld>
@@ -13910,13 +14722,13 @@
         </p:nvSpPr>
         <p:spPr>
           <a:xfrm>
-            <a:off x="1154954" y="2603500"/>
-            <a:ext cx="8825659" cy="3948302"/>
+            <a:off x="1154954" y="2323750"/>
+            <a:ext cx="8825659" cy="4328720"/>
           </a:xfrm>
         </p:spPr>
         <p:txBody>
           <a:bodyPr>
-            <a:normAutofit/>
+            <a:normAutofit fontScale="92500" lnSpcReduction="10000"/>
           </a:bodyPr>
           <a:lstStyle/>
           <a:p>
@@ -13945,7 +14757,7 @@
             </a:r>
             <a:r>
               <a:rPr lang="en-US" dirty="0"/>
-              <a:t>)</a:t>
+              <a:t>).</a:t>
             </a:r>
           </a:p>
           <a:p>
@@ -13997,6 +14809,18 @@
             <a:r>
               <a:rPr lang="en-US" dirty="0"/>
               <a:t>I2c RGB LED Matrix panel connected to the I2c bus (FrcI2cLEDPanel).</a:t>
+            </a:r>
+          </a:p>
+          <a:p>
+            <a:r>
+              <a:rPr lang="en-US" dirty="0"/>
+              <a:t>Playing music on Talon FX motor controllers.</a:t>
+            </a:r>
+          </a:p>
+          <a:p>
+            <a:r>
+              <a:rPr lang="en-US" dirty="0"/>
+              <a:t>Doing input/output on the Driver Station.</a:t>
             </a:r>
           </a:p>
         </p:txBody>
@@ -14123,7 +14947,7 @@
           <a:p>
             <a:r>
               <a:rPr lang="en-US" dirty="0"/>
-              <a:t>12V RGB LED strips have 4 pins: 12V, R, G and B. They are usually common cathode LEDs. That means they can’t be powered by typical components and must use some sort of LED driver circuit.</a:t>
+              <a:t>12V RGB LED strips have 4 pins: 12V, R, G and B. They are usually common anode LEDs. That means they can’t be powered by typical components and must use some sort of LED driver circuit.</a:t>
             </a:r>
           </a:p>
           <a:p>

</xml_diff>